<commit_message>
final pp presentation of the project
</commit_message>
<xml_diff>
--- a/reports/Team Project Presentation.pptx
+++ b/reports/Team Project Presentation.pptx
@@ -205,7 +205,7 @@
           <a:p>
             <a:fld id="{4A54BDD6-8B54-1D43-9B29-7BFF89FE46CD}" type="datetimeFigureOut">
               <a:rPr lang="x-none" smtClean="0"/>
-              <a:t>14/11/25</a:t>
+              <a:t>15/11/25</a:t>
             </a:fld>
             <a:endParaRPr lang="x-none"/>
           </a:p>
@@ -619,6 +619,165 @@
             <a:endParaRPr lang="es-419" dirty="0"/>
           </a:p>
           <a:p>
+            <a:r>
+              <a:rPr lang="en-CO" sz="1200" b="1" kern="1200" dirty="0">
+                <a:solidFill>
+                  <a:schemeClr val="tx1"/>
+                </a:solidFill>
+                <a:effectLst/>
+                <a:latin typeface="+mn-lt"/>
+                <a:ea typeface="+mn-ea"/>
+                <a:cs typeface="+mn-cs"/>
+              </a:rPr>
+              <a:t>Slide 3. </a:t>
+            </a:r>
+            <a:endParaRPr lang="en-CO" sz="1100" kern="1200" dirty="0">
+              <a:solidFill>
+                <a:schemeClr val="tx1"/>
+              </a:solidFill>
+              <a:effectLst/>
+              <a:latin typeface="+mn-lt"/>
+              <a:ea typeface="+mn-ea"/>
+              <a:cs typeface="+mn-cs"/>
+            </a:endParaRPr>
+          </a:p>
+          <a:p>
+            <a:pPr lvl="0"/>
+            <a:r>
+              <a:rPr lang="en-CO" sz="1200" b="1" kern="1200" dirty="0">
+                <a:solidFill>
+                  <a:schemeClr val="tx1"/>
+                </a:solidFill>
+                <a:effectLst/>
+                <a:latin typeface="+mn-lt"/>
+                <a:ea typeface="+mn-ea"/>
+                <a:cs typeface="+mn-cs"/>
+              </a:rPr>
+              <a:t>Imbalance:</a:t>
+            </a:r>
+            <a:r>
+              <a:rPr lang="en-CO" sz="1200" kern="1200" dirty="0">
+                <a:solidFill>
+                  <a:schemeClr val="tx1"/>
+                </a:solidFill>
+                <a:effectLst/>
+                <a:latin typeface="+mn-lt"/>
+                <a:ea typeface="+mn-ea"/>
+                <a:cs typeface="+mn-cs"/>
+              </a:rPr>
+              <a:t> 5,110 observations</a:t>
+            </a:r>
+          </a:p>
+          <a:p>
+            <a:pPr lvl="1"/>
+            <a:r>
+              <a:rPr lang="en-CO" sz="1200" kern="1200" dirty="0">
+                <a:solidFill>
+                  <a:schemeClr val="tx1"/>
+                </a:solidFill>
+                <a:effectLst/>
+                <a:latin typeface="+mn-lt"/>
+                <a:ea typeface="+mn-ea"/>
+                <a:cs typeface="+mn-cs"/>
+              </a:rPr>
+              <a:t>856 individuals under 18 years old</a:t>
+            </a:r>
+          </a:p>
+          <a:p>
+            <a:pPr lvl="1"/>
+            <a:r>
+              <a:rPr lang="en-CO" sz="1200" kern="1200" dirty="0">
+                <a:solidFill>
+                  <a:schemeClr val="tx1"/>
+                </a:solidFill>
+                <a:effectLst/>
+                <a:latin typeface="+mn-lt"/>
+                <a:ea typeface="+mn-ea"/>
+                <a:cs typeface="+mn-cs"/>
+              </a:rPr>
+              <a:t>249 stroke cases (only 2 pediatric)</a:t>
+            </a:r>
+          </a:p>
+          <a:p>
+            <a:pPr lvl="1"/>
+            <a:r>
+              <a:rPr lang="en-CO" sz="1200" kern="1200" dirty="0">
+                <a:solidFill>
+                  <a:schemeClr val="tx1"/>
+                </a:solidFill>
+                <a:effectLst/>
+                <a:latin typeface="+mn-lt"/>
+                <a:ea typeface="+mn-ea"/>
+                <a:cs typeface="+mn-cs"/>
+              </a:rPr>
+              <a:t>4,007 non-stroke cases</a:t>
+            </a:r>
+          </a:p>
+          <a:p>
+            <a:pPr lvl="0"/>
+            <a:r>
+              <a:rPr lang="en-CO" sz="1200" b="1" kern="1200" dirty="0">
+                <a:solidFill>
+                  <a:schemeClr val="tx1"/>
+                </a:solidFill>
+                <a:effectLst/>
+                <a:latin typeface="+mn-lt"/>
+                <a:ea typeface="+mn-ea"/>
+                <a:cs typeface="+mn-cs"/>
+              </a:rPr>
+              <a:t>Confounding factors:</a:t>
+            </a:r>
+            <a:br>
+              <a:rPr lang="en-CO" sz="1200" kern="1200" dirty="0">
+                <a:solidFill>
+                  <a:schemeClr val="tx1"/>
+                </a:solidFill>
+                <a:effectLst/>
+                <a:latin typeface="+mn-lt"/>
+                <a:ea typeface="+mn-ea"/>
+                <a:cs typeface="+mn-cs"/>
+              </a:rPr>
+            </a:br>
+            <a:r>
+              <a:rPr lang="en-CO" sz="1200" kern="1200" dirty="0">
+                <a:solidFill>
+                  <a:schemeClr val="tx1"/>
+                </a:solidFill>
+                <a:effectLst/>
+                <a:latin typeface="+mn-lt"/>
+                <a:ea typeface="+mn-ea"/>
+                <a:cs typeface="+mn-cs"/>
+              </a:rPr>
+              <a:t>As our goal was to support stroke prevention, we need considered the important differences between adults and pediatric population.</a:t>
+            </a:r>
+            <a:br>
+              <a:rPr lang="en-CO" sz="1200" kern="1200" dirty="0">
+                <a:solidFill>
+                  <a:schemeClr val="tx1"/>
+                </a:solidFill>
+                <a:effectLst/>
+                <a:latin typeface="+mn-lt"/>
+                <a:ea typeface="+mn-ea"/>
+                <a:cs typeface="+mn-cs"/>
+              </a:rPr>
+            </a:br>
+            <a:r>
+              <a:rPr lang="en-CO" sz="1200" kern="1200" dirty="0">
+                <a:solidFill>
+                  <a:schemeClr val="tx1"/>
+                </a:solidFill>
+                <a:effectLst/>
+                <a:latin typeface="+mn-lt"/>
+                <a:ea typeface="+mn-ea"/>
+                <a:cs typeface="+mn-cs"/>
+              </a:rPr>
+              <a:t>Because the causes of stroke in children are mostly related to genetic factors and non-preventable conditions—and because the incidence is very low—the pediatric population was removed from the analysis and the model. This helped reduce confounding factors associated with their differences compared to adults AND INCREASED THE ACCURACY OF THE MODEL.</a:t>
+            </a:r>
+          </a:p>
+          <a:p>
+            <a:endParaRPr lang="es-419" dirty="0"/>
+          </a:p>
+          <a:p>
             <a:pPr marL="0" marR="0" lvl="0" indent="0" algn="l" defTabSz="914400" rtl="0" eaLnBrk="1" fontAlgn="auto" latinLnBrk="0" hangingPunct="1">
               <a:lnSpc>
                 <a:spcPct val="100000"/>
@@ -724,9 +883,280 @@
           <a:lstStyle/>
           <a:p>
             <a:r>
-              <a:rPr lang="x-none" dirty="0"/>
-              <a:t>Mariluz</a:t>
-            </a:r>
+              <a:rPr lang="x-none"/>
+              <a:t>Marilu</a:t>
+            </a:r>
+            <a:r>
+              <a:rPr lang="es-419" dirty="0"/>
+              <a:t>z</a:t>
+            </a:r>
+            <a:br>
+              <a:rPr lang="es-419" dirty="0"/>
+            </a:br>
+            <a:r>
+              <a:rPr lang="en-CO" sz="1200" b="1" kern="1200" dirty="0">
+                <a:solidFill>
+                  <a:schemeClr val="tx1"/>
+                </a:solidFill>
+                <a:effectLst/>
+                <a:latin typeface="+mn-lt"/>
+                <a:ea typeface="+mn-ea"/>
+                <a:cs typeface="+mn-cs"/>
+              </a:rPr>
+              <a:t>Slide 4. </a:t>
+            </a:r>
+            <a:endParaRPr lang="en-CO" sz="1100" kern="1200" dirty="0">
+              <a:solidFill>
+                <a:schemeClr val="tx1"/>
+              </a:solidFill>
+              <a:effectLst/>
+              <a:latin typeface="+mn-lt"/>
+              <a:ea typeface="+mn-ea"/>
+              <a:cs typeface="+mn-cs"/>
+            </a:endParaRPr>
+          </a:p>
+          <a:p>
+            <a:pPr lvl="0"/>
+            <a:r>
+              <a:rPr lang="en-CO" sz="1200" kern="1200" dirty="0">
+                <a:solidFill>
+                  <a:schemeClr val="tx1"/>
+                </a:solidFill>
+                <a:effectLst/>
+                <a:latin typeface="+mn-lt"/>
+                <a:ea typeface="+mn-ea"/>
+                <a:cs typeface="+mn-cs"/>
+              </a:rPr>
+              <a:t>After a statistical analysis comparing the stroke group with the non-stroke group:</a:t>
+            </a:r>
+          </a:p>
+          <a:p>
+            <a:pPr lvl="1"/>
+            <a:r>
+              <a:rPr lang="en-CO" sz="1200" kern="1200" dirty="0">
+                <a:solidFill>
+                  <a:schemeClr val="tx1"/>
+                </a:solidFill>
+                <a:effectLst/>
+                <a:latin typeface="+mn-lt"/>
+                <a:ea typeface="+mn-ea"/>
+                <a:cs typeface="+mn-cs"/>
+              </a:rPr>
+              <a:t>We removed </a:t>
+            </a:r>
+            <a:r>
+              <a:rPr lang="en-CO" sz="1200" b="1" kern="1200" dirty="0">
+                <a:solidFill>
+                  <a:schemeClr val="tx1"/>
+                </a:solidFill>
+                <a:effectLst/>
+                <a:latin typeface="+mn-lt"/>
+                <a:ea typeface="+mn-ea"/>
+                <a:cs typeface="+mn-cs"/>
+              </a:rPr>
+              <a:t>gender</a:t>
+            </a:r>
+            <a:r>
+              <a:rPr lang="en-CO" sz="1200" kern="1200" dirty="0">
+                <a:solidFill>
+                  <a:schemeClr val="tx1"/>
+                </a:solidFill>
+                <a:effectLst/>
+                <a:latin typeface="+mn-lt"/>
+                <a:ea typeface="+mn-ea"/>
+                <a:cs typeface="+mn-cs"/>
+              </a:rPr>
+              <a:t> and </a:t>
+            </a:r>
+            <a:r>
+              <a:rPr lang="en-CO" sz="1200" b="1" kern="1200" dirty="0">
+                <a:solidFill>
+                  <a:schemeClr val="tx1"/>
+                </a:solidFill>
+                <a:effectLst/>
+                <a:latin typeface="+mn-lt"/>
+                <a:ea typeface="+mn-ea"/>
+                <a:cs typeface="+mn-cs"/>
+              </a:rPr>
+              <a:t>residence type</a:t>
+            </a:r>
+            <a:r>
+              <a:rPr lang="en-CO" sz="1200" kern="1200" dirty="0">
+                <a:solidFill>
+                  <a:schemeClr val="tx1"/>
+                </a:solidFill>
+                <a:effectLst/>
+                <a:latin typeface="+mn-lt"/>
+                <a:ea typeface="+mn-ea"/>
+                <a:cs typeface="+mn-cs"/>
+              </a:rPr>
+              <a:t> due to non-significant differences.</a:t>
+            </a:r>
+          </a:p>
+          <a:p>
+            <a:pPr lvl="1"/>
+            <a:r>
+              <a:rPr lang="en-CO" sz="1200" kern="1200" dirty="0">
+                <a:solidFill>
+                  <a:schemeClr val="tx1"/>
+                </a:solidFill>
+                <a:effectLst/>
+                <a:latin typeface="+mn-lt"/>
+                <a:ea typeface="+mn-ea"/>
+                <a:cs typeface="+mn-cs"/>
+              </a:rPr>
+              <a:t>Initially, the analysis showed that  </a:t>
+            </a:r>
+            <a:r>
+              <a:rPr lang="en-CO" sz="1200" b="1" kern="1200" dirty="0">
+                <a:solidFill>
+                  <a:schemeClr val="tx1"/>
+                </a:solidFill>
+                <a:effectLst/>
+                <a:latin typeface="+mn-lt"/>
+                <a:ea typeface="+mn-ea"/>
+                <a:cs typeface="+mn-cs"/>
+              </a:rPr>
+              <a:t>ever merred was correlated with stroke</a:t>
+            </a:r>
+            <a:r>
+              <a:rPr lang="en-CO" sz="1200" kern="1200" dirty="0">
+                <a:solidFill>
+                  <a:schemeClr val="tx1"/>
+                </a:solidFill>
+                <a:effectLst/>
+                <a:latin typeface="+mn-lt"/>
+                <a:ea typeface="+mn-ea"/>
+                <a:cs typeface="+mn-cs"/>
+              </a:rPr>
+              <a:t>, but after adjusting for age, this difference was no longer significant.</a:t>
+            </a:r>
+          </a:p>
+          <a:p>
+            <a:pPr lvl="0"/>
+            <a:r>
+              <a:rPr lang="en-CO" sz="1200" kern="1200" dirty="0">
+                <a:solidFill>
+                  <a:schemeClr val="tx1"/>
+                </a:solidFill>
+                <a:effectLst/>
+                <a:latin typeface="+mn-lt"/>
+                <a:ea typeface="+mn-ea"/>
+                <a:cs typeface="+mn-cs"/>
+              </a:rPr>
+              <a:t>We included only the features that showed statistically significant differences to improve the accuracy of the predictive model:</a:t>
+            </a:r>
+          </a:p>
+          <a:p>
+            <a:pPr lvl="1"/>
+            <a:r>
+              <a:rPr lang="en-CO" sz="1200" b="1" kern="1200" dirty="0">
+                <a:solidFill>
+                  <a:schemeClr val="tx1"/>
+                </a:solidFill>
+                <a:effectLst/>
+                <a:latin typeface="+mn-lt"/>
+                <a:ea typeface="+mn-ea"/>
+                <a:cs typeface="+mn-cs"/>
+              </a:rPr>
+              <a:t>Invariable demographic factors:</a:t>
+            </a:r>
+            <a:r>
+              <a:rPr lang="en-CO" sz="1200" kern="1200" dirty="0">
+                <a:solidFill>
+                  <a:schemeClr val="tx1"/>
+                </a:solidFill>
+                <a:effectLst/>
+                <a:latin typeface="+mn-lt"/>
+                <a:ea typeface="+mn-ea"/>
+                <a:cs typeface="+mn-cs"/>
+              </a:rPr>
+              <a:t> Age</a:t>
+            </a:r>
+          </a:p>
+          <a:p>
+            <a:pPr lvl="1"/>
+            <a:r>
+              <a:rPr lang="en-CO" sz="1200" b="1" kern="1200" dirty="0">
+                <a:solidFill>
+                  <a:schemeClr val="tx1"/>
+                </a:solidFill>
+                <a:effectLst/>
+                <a:latin typeface="+mn-lt"/>
+                <a:ea typeface="+mn-ea"/>
+                <a:cs typeface="+mn-cs"/>
+              </a:rPr>
+              <a:t>Potentially variable demographic factors:</a:t>
+            </a:r>
+            <a:r>
+              <a:rPr lang="en-CO" sz="1200" kern="1200" dirty="0">
+                <a:solidFill>
+                  <a:schemeClr val="tx1"/>
+                </a:solidFill>
+                <a:effectLst/>
+                <a:latin typeface="+mn-lt"/>
+                <a:ea typeface="+mn-ea"/>
+                <a:cs typeface="+mn-cs"/>
+              </a:rPr>
+              <a:t> Work Type</a:t>
+            </a:r>
+          </a:p>
+          <a:p>
+            <a:pPr lvl="1"/>
+            <a:r>
+              <a:rPr lang="en-CO" sz="1200" b="1" kern="1200" dirty="0">
+                <a:solidFill>
+                  <a:schemeClr val="tx1"/>
+                </a:solidFill>
+                <a:effectLst/>
+                <a:latin typeface="+mn-lt"/>
+                <a:ea typeface="+mn-ea"/>
+                <a:cs typeface="+mn-cs"/>
+              </a:rPr>
+              <a:t>Variable risk factors:</a:t>
+            </a:r>
+            <a:r>
+              <a:rPr lang="en-CO" sz="1200" kern="1200" dirty="0">
+                <a:solidFill>
+                  <a:schemeClr val="tx1"/>
+                </a:solidFill>
+                <a:effectLst/>
+                <a:latin typeface="+mn-lt"/>
+                <a:ea typeface="+mn-ea"/>
+                <a:cs typeface="+mn-cs"/>
+              </a:rPr>
+              <a:t> Glucose level, BMI, Smoking status</a:t>
+            </a:r>
+          </a:p>
+          <a:p>
+            <a:pPr lvl="1"/>
+            <a:r>
+              <a:rPr lang="en-CO" sz="1200" b="1" kern="1200" dirty="0">
+                <a:solidFill>
+                  <a:schemeClr val="tx1"/>
+                </a:solidFill>
+                <a:effectLst/>
+                <a:latin typeface="+mn-lt"/>
+                <a:ea typeface="+mn-ea"/>
+                <a:cs typeface="+mn-cs"/>
+              </a:rPr>
+              <a:t>Invariable risk factors (comorbidities):</a:t>
+            </a:r>
+            <a:r>
+              <a:rPr lang="en-CO" sz="1200" kern="1200" dirty="0">
+                <a:solidFill>
+                  <a:schemeClr val="tx1"/>
+                </a:solidFill>
+                <a:effectLst/>
+                <a:latin typeface="+mn-lt"/>
+                <a:ea typeface="+mn-ea"/>
+                <a:cs typeface="+mn-cs"/>
+              </a:rPr>
+              <a:t> Hypertension and Heart Disease</a:t>
+            </a:r>
+          </a:p>
+          <a:p>
+            <a:endParaRPr lang="x-none" dirty="0"/>
           </a:p>
         </p:txBody>
       </p:sp>
@@ -899,9 +1329,399 @@
           <a:lstStyle/>
           <a:p>
             <a:r>
-              <a:rPr lang="x-none" dirty="0"/>
+              <a:rPr lang="x-none"/>
               <a:t>Mariluz</a:t>
             </a:r>
+            <a:r>
+              <a:rPr lang="en-CO" sz="1200" b="1" kern="1200" dirty="0">
+                <a:solidFill>
+                  <a:schemeClr val="tx1"/>
+                </a:solidFill>
+                <a:effectLst/>
+                <a:latin typeface="+mn-lt"/>
+                <a:ea typeface="+mn-ea"/>
+                <a:cs typeface="+mn-cs"/>
+              </a:rPr>
+              <a:t>Slide 6. </a:t>
+            </a:r>
+            <a:endParaRPr lang="en-CO" sz="1200" kern="1200" dirty="0">
+              <a:solidFill>
+                <a:schemeClr val="tx1"/>
+              </a:solidFill>
+              <a:effectLst/>
+              <a:latin typeface="+mn-lt"/>
+              <a:ea typeface="+mn-ea"/>
+              <a:cs typeface="+mn-cs"/>
+            </a:endParaRPr>
+          </a:p>
+          <a:p>
+            <a:r>
+              <a:rPr lang="en-CO" sz="1200" b="1" kern="1200" dirty="0">
+                <a:solidFill>
+                  <a:schemeClr val="tx1"/>
+                </a:solidFill>
+                <a:effectLst/>
+                <a:latin typeface="+mn-lt"/>
+                <a:ea typeface="+mn-ea"/>
+                <a:cs typeface="+mn-cs"/>
+              </a:rPr>
+              <a:t>The population most likely to have a stroke :</a:t>
+            </a:r>
+            <a:endParaRPr lang="en-CO" sz="1200" kern="1200" dirty="0">
+              <a:solidFill>
+                <a:schemeClr val="tx1"/>
+              </a:solidFill>
+              <a:effectLst/>
+              <a:latin typeface="+mn-lt"/>
+              <a:ea typeface="+mn-ea"/>
+              <a:cs typeface="+mn-cs"/>
+            </a:endParaRPr>
+          </a:p>
+          <a:p>
+            <a:pPr lvl="0"/>
+            <a:r>
+              <a:rPr lang="en-CO" sz="1200" kern="1200" dirty="0">
+                <a:solidFill>
+                  <a:schemeClr val="tx1"/>
+                </a:solidFill>
+                <a:effectLst/>
+                <a:latin typeface="+mn-lt"/>
+                <a:ea typeface="+mn-ea"/>
+                <a:cs typeface="+mn-cs"/>
+              </a:rPr>
+              <a:t>- Individuals </a:t>
+            </a:r>
+            <a:r>
+              <a:rPr lang="en-CO" sz="1200" b="1" kern="1200" dirty="0">
+                <a:solidFill>
+                  <a:schemeClr val="tx1"/>
+                </a:solidFill>
+                <a:effectLst/>
+                <a:latin typeface="+mn-lt"/>
+                <a:ea typeface="+mn-ea"/>
+                <a:cs typeface="+mn-cs"/>
+              </a:rPr>
+              <a:t>over 57 years old</a:t>
+            </a:r>
+            <a:endParaRPr lang="en-CO" sz="1200" kern="1200" dirty="0">
+              <a:solidFill>
+                <a:schemeClr val="tx1"/>
+              </a:solidFill>
+              <a:effectLst/>
+              <a:latin typeface="+mn-lt"/>
+              <a:ea typeface="+mn-ea"/>
+              <a:cs typeface="+mn-cs"/>
+            </a:endParaRPr>
+          </a:p>
+          <a:p>
+            <a:pPr lvl="0"/>
+            <a:r>
+              <a:rPr lang="en-CO" sz="1200" kern="1200" dirty="0">
+                <a:solidFill>
+                  <a:schemeClr val="tx1"/>
+                </a:solidFill>
+                <a:effectLst/>
+                <a:latin typeface="+mn-lt"/>
+                <a:ea typeface="+mn-ea"/>
+                <a:cs typeface="+mn-cs"/>
+              </a:rPr>
+              <a:t>- comorbidities such as </a:t>
+            </a:r>
+            <a:r>
+              <a:rPr lang="en-CO" sz="1200" b="1" kern="1200" dirty="0">
+                <a:solidFill>
+                  <a:schemeClr val="tx1"/>
+                </a:solidFill>
+                <a:effectLst/>
+                <a:latin typeface="+mn-lt"/>
+                <a:ea typeface="+mn-ea"/>
+                <a:cs typeface="+mn-cs"/>
+              </a:rPr>
+              <a:t>heart disease</a:t>
+            </a:r>
+            <a:r>
+              <a:rPr lang="en-CO" sz="1200" kern="1200" dirty="0">
+                <a:solidFill>
+                  <a:schemeClr val="tx1"/>
+                </a:solidFill>
+                <a:effectLst/>
+                <a:latin typeface="+mn-lt"/>
+                <a:ea typeface="+mn-ea"/>
+                <a:cs typeface="+mn-cs"/>
+              </a:rPr>
+              <a:t> or </a:t>
+            </a:r>
+            <a:r>
+              <a:rPr lang="en-CO" sz="1200" b="1" kern="1200" dirty="0">
+                <a:solidFill>
+                  <a:schemeClr val="tx1"/>
+                </a:solidFill>
+                <a:effectLst/>
+                <a:latin typeface="+mn-lt"/>
+                <a:ea typeface="+mn-ea"/>
+                <a:cs typeface="+mn-cs"/>
+              </a:rPr>
+              <a:t>hypertension</a:t>
+            </a:r>
+            <a:endParaRPr lang="en-CO" sz="1200" kern="1200" dirty="0">
+              <a:solidFill>
+                <a:schemeClr val="tx1"/>
+              </a:solidFill>
+              <a:effectLst/>
+              <a:latin typeface="+mn-lt"/>
+              <a:ea typeface="+mn-ea"/>
+              <a:cs typeface="+mn-cs"/>
+            </a:endParaRPr>
+          </a:p>
+          <a:p>
+            <a:pPr lvl="0"/>
+            <a:r>
+              <a:rPr lang="en-CO" sz="1200" kern="1200" dirty="0">
+                <a:solidFill>
+                  <a:schemeClr val="tx1"/>
+                </a:solidFill>
+                <a:effectLst/>
+                <a:latin typeface="+mn-lt"/>
+                <a:ea typeface="+mn-ea"/>
+                <a:cs typeface="+mn-cs"/>
+              </a:rPr>
+              <a:t>- </a:t>
+            </a:r>
+            <a:r>
+              <a:rPr lang="en-CO" sz="1200" b="1" kern="1200" dirty="0">
+                <a:solidFill>
+                  <a:schemeClr val="tx1"/>
+                </a:solidFill>
+                <a:effectLst/>
+                <a:latin typeface="+mn-lt"/>
+                <a:ea typeface="+mn-ea"/>
+                <a:cs typeface="+mn-cs"/>
+              </a:rPr>
+              <a:t>glucose levels in the pre-diabetes or diabetes range</a:t>
+            </a:r>
+            <a:endParaRPr lang="en-CO" sz="1200" kern="1200" dirty="0">
+              <a:solidFill>
+                <a:schemeClr val="tx1"/>
+              </a:solidFill>
+              <a:effectLst/>
+              <a:latin typeface="+mn-lt"/>
+              <a:ea typeface="+mn-ea"/>
+              <a:cs typeface="+mn-cs"/>
+            </a:endParaRPr>
+          </a:p>
+          <a:p>
+            <a:pPr lvl="0"/>
+            <a:r>
+              <a:rPr lang="en-CO" sz="1200" kern="1200" dirty="0">
+                <a:solidFill>
+                  <a:schemeClr val="tx1"/>
+                </a:solidFill>
+                <a:effectLst/>
+                <a:latin typeface="+mn-lt"/>
+                <a:ea typeface="+mn-ea"/>
+                <a:cs typeface="+mn-cs"/>
+              </a:rPr>
+              <a:t>- risk factors such as </a:t>
+            </a:r>
+            <a:r>
+              <a:rPr lang="en-CO" sz="1200" b="1" kern="1200" dirty="0">
+                <a:solidFill>
+                  <a:schemeClr val="tx1"/>
+                </a:solidFill>
+                <a:effectLst/>
+                <a:latin typeface="+mn-lt"/>
+                <a:ea typeface="+mn-ea"/>
+                <a:cs typeface="+mn-cs"/>
+              </a:rPr>
+              <a:t>overweight</a:t>
+            </a:r>
+            <a:r>
+              <a:rPr lang="en-CO" sz="1200" kern="1200" dirty="0">
+                <a:solidFill>
+                  <a:schemeClr val="tx1"/>
+                </a:solidFill>
+                <a:effectLst/>
+                <a:latin typeface="+mn-lt"/>
+                <a:ea typeface="+mn-ea"/>
+                <a:cs typeface="+mn-cs"/>
+              </a:rPr>
+              <a:t>, </a:t>
+            </a:r>
+            <a:r>
+              <a:rPr lang="en-CO" sz="1200" b="1" kern="1200" dirty="0">
+                <a:solidFill>
+                  <a:schemeClr val="tx1"/>
+                </a:solidFill>
+                <a:effectLst/>
+                <a:latin typeface="+mn-lt"/>
+                <a:ea typeface="+mn-ea"/>
+                <a:cs typeface="+mn-cs"/>
+              </a:rPr>
+              <a:t>former smoking</a:t>
+            </a:r>
+            <a:r>
+              <a:rPr lang="en-CO" sz="1200" kern="1200" dirty="0">
+                <a:solidFill>
+                  <a:schemeClr val="tx1"/>
+                </a:solidFill>
+                <a:effectLst/>
+                <a:latin typeface="+mn-lt"/>
+                <a:ea typeface="+mn-ea"/>
+                <a:cs typeface="+mn-cs"/>
+              </a:rPr>
+              <a:t>, or </a:t>
+            </a:r>
+            <a:r>
+              <a:rPr lang="en-CO" sz="1200" b="1" kern="1200" dirty="0">
+                <a:solidFill>
+                  <a:schemeClr val="tx1"/>
+                </a:solidFill>
+                <a:effectLst/>
+                <a:latin typeface="+mn-lt"/>
+                <a:ea typeface="+mn-ea"/>
+                <a:cs typeface="+mn-cs"/>
+              </a:rPr>
+              <a:t>current smoking</a:t>
+            </a:r>
+            <a:endParaRPr lang="en-CO" sz="1200" kern="1200" dirty="0">
+              <a:solidFill>
+                <a:schemeClr val="tx1"/>
+              </a:solidFill>
+              <a:effectLst/>
+              <a:latin typeface="+mn-lt"/>
+              <a:ea typeface="+mn-ea"/>
+              <a:cs typeface="+mn-cs"/>
+            </a:endParaRPr>
+          </a:p>
+          <a:p>
+            <a:endParaRPr lang="en-CO" sz="1200" b="1" kern="1200" dirty="0">
+              <a:solidFill>
+                <a:schemeClr val="tx1"/>
+              </a:solidFill>
+              <a:effectLst/>
+              <a:latin typeface="+mn-lt"/>
+              <a:ea typeface="+mn-ea"/>
+              <a:cs typeface="+mn-cs"/>
+            </a:endParaRPr>
+          </a:p>
+          <a:p>
+            <a:r>
+              <a:rPr lang="en-CO" sz="1200" b="1" kern="1200" dirty="0">
+                <a:solidFill>
+                  <a:schemeClr val="tx1"/>
+                </a:solidFill>
+                <a:effectLst/>
+                <a:latin typeface="+mn-lt"/>
+                <a:ea typeface="+mn-ea"/>
+                <a:cs typeface="+mn-cs"/>
+              </a:rPr>
+              <a:t>Protective factors:</a:t>
+            </a:r>
+            <a:endParaRPr lang="en-CO" sz="1200" kern="1200" dirty="0">
+              <a:solidFill>
+                <a:schemeClr val="tx1"/>
+              </a:solidFill>
+              <a:effectLst/>
+              <a:latin typeface="+mn-lt"/>
+              <a:ea typeface="+mn-ea"/>
+              <a:cs typeface="+mn-cs"/>
+            </a:endParaRPr>
+          </a:p>
+          <a:p>
+            <a:pPr lvl="0"/>
+            <a:r>
+              <a:rPr lang="en-CO" sz="1200" kern="1200" dirty="0">
+                <a:solidFill>
+                  <a:schemeClr val="tx1"/>
+                </a:solidFill>
+                <a:effectLst/>
+                <a:latin typeface="+mn-lt"/>
+                <a:ea typeface="+mn-ea"/>
+                <a:cs typeface="+mn-cs"/>
+              </a:rPr>
+              <a:t>Healthy weight</a:t>
+            </a:r>
+          </a:p>
+          <a:p>
+            <a:pPr lvl="0"/>
+            <a:r>
+              <a:rPr lang="en-CO" sz="1200" kern="1200" dirty="0">
+                <a:solidFill>
+                  <a:schemeClr val="tx1"/>
+                </a:solidFill>
+                <a:effectLst/>
+                <a:latin typeface="+mn-lt"/>
+                <a:ea typeface="+mn-ea"/>
+                <a:cs typeface="+mn-cs"/>
+              </a:rPr>
+              <a:t>Healthy average glucose levels</a:t>
+            </a:r>
+          </a:p>
+          <a:p>
+            <a:pPr lvl="0"/>
+            <a:r>
+              <a:rPr lang="en-CO" sz="1200" kern="1200" dirty="0">
+                <a:solidFill>
+                  <a:schemeClr val="tx1"/>
+                </a:solidFill>
+                <a:effectLst/>
+                <a:latin typeface="+mn-lt"/>
+                <a:ea typeface="+mn-ea"/>
+                <a:cs typeface="+mn-cs"/>
+              </a:rPr>
+              <a:t>Never smoked</a:t>
+            </a:r>
+          </a:p>
+          <a:p>
+            <a:pPr lvl="0"/>
+            <a:endParaRPr lang="en-CO" sz="1200" kern="1200" dirty="0">
+              <a:solidFill>
+                <a:schemeClr val="tx1"/>
+              </a:solidFill>
+              <a:effectLst/>
+              <a:latin typeface="+mn-lt"/>
+              <a:ea typeface="+mn-ea"/>
+              <a:cs typeface="+mn-cs"/>
+            </a:endParaRPr>
+          </a:p>
+          <a:p>
+            <a:pPr lvl="0"/>
+            <a:r>
+              <a:rPr lang="en-CO" sz="1200" kern="1200" dirty="0">
+                <a:solidFill>
+                  <a:schemeClr val="tx1"/>
+                </a:solidFill>
+                <a:effectLst/>
+                <a:latin typeface="+mn-lt"/>
+                <a:ea typeface="+mn-ea"/>
+                <a:cs typeface="+mn-cs"/>
+              </a:rPr>
+              <a:t>OUR RECOMENDATION IS START </a:t>
+            </a:r>
+            <a:r>
+              <a:rPr lang="en-CO" sz="1200" b="1" kern="1200" dirty="0">
+                <a:solidFill>
+                  <a:schemeClr val="tx1"/>
+                </a:solidFill>
+                <a:effectLst/>
+                <a:latin typeface="+mn-lt"/>
+                <a:ea typeface="+mn-ea"/>
+                <a:cs typeface="+mn-cs"/>
+              </a:rPr>
+              <a:t>preventive campaigns BEFORE 57 YEARS OLD WITH TARGET IN THIS VARIABLES TO HAVE A REAL IMPACT IN STROKE INCIDENCE.</a:t>
+            </a:r>
+            <a:endParaRPr lang="en-CO" sz="1200" kern="1200" dirty="0">
+              <a:solidFill>
+                <a:schemeClr val="tx1"/>
+              </a:solidFill>
+              <a:effectLst/>
+              <a:latin typeface="+mn-lt"/>
+              <a:ea typeface="+mn-ea"/>
+              <a:cs typeface="+mn-cs"/>
+            </a:endParaRPr>
+          </a:p>
+          <a:p>
+            <a:endParaRPr lang="x-none" dirty="0"/>
           </a:p>
         </p:txBody>
       </p:sp>
@@ -986,9 +1806,141 @@
           <a:lstStyle/>
           <a:p>
             <a:r>
-              <a:rPr lang="x-none" dirty="0"/>
+              <a:rPr lang="x-none"/>
               <a:t>Mariluz</a:t>
             </a:r>
+            <a:br>
+              <a:rPr lang="es-419" dirty="0"/>
+            </a:br>
+            <a:r>
+              <a:rPr lang="en-CO" sz="1200" b="1" kern="1200" dirty="0">
+                <a:solidFill>
+                  <a:schemeClr val="tx1"/>
+                </a:solidFill>
+                <a:effectLst/>
+                <a:latin typeface="+mn-lt"/>
+                <a:ea typeface="+mn-ea"/>
+                <a:cs typeface="+mn-cs"/>
+              </a:rPr>
+              <a:t>Slide 7. </a:t>
+            </a:r>
+            <a:endParaRPr lang="en-CO" sz="1200" kern="1200" dirty="0">
+              <a:solidFill>
+                <a:schemeClr val="tx1"/>
+              </a:solidFill>
+              <a:effectLst/>
+              <a:latin typeface="+mn-lt"/>
+              <a:ea typeface="+mn-ea"/>
+              <a:cs typeface="+mn-cs"/>
+            </a:endParaRPr>
+          </a:p>
+          <a:p>
+            <a:pPr lvl="0"/>
+            <a:r>
+              <a:rPr lang="en-CO" sz="1200" kern="1200" dirty="0">
+                <a:solidFill>
+                  <a:schemeClr val="tx1"/>
+                </a:solidFill>
+                <a:effectLst/>
+                <a:latin typeface="+mn-lt"/>
+                <a:ea typeface="+mn-ea"/>
+                <a:cs typeface="+mn-cs"/>
+              </a:rPr>
+              <a:t>Proper categorization of the dataset is essential.</a:t>
+            </a:r>
+          </a:p>
+          <a:p>
+            <a:pPr lvl="0"/>
+            <a:r>
+              <a:rPr lang="en-CO" sz="1200" kern="1200" dirty="0">
+                <a:solidFill>
+                  <a:schemeClr val="tx1"/>
+                </a:solidFill>
+                <a:effectLst/>
+                <a:latin typeface="+mn-lt"/>
+                <a:ea typeface="+mn-ea"/>
+                <a:cs typeface="+mn-cs"/>
+              </a:rPr>
+              <a:t>Comparing groups properly </a:t>
+            </a:r>
+            <a:r>
+              <a:rPr lang="en-CO" sz="1200" b="1" kern="1200" dirty="0">
+                <a:solidFill>
+                  <a:schemeClr val="tx1"/>
+                </a:solidFill>
+                <a:effectLst/>
+                <a:latin typeface="+mn-lt"/>
+                <a:ea typeface="+mn-ea"/>
+                <a:cs typeface="+mn-cs"/>
+              </a:rPr>
+              <a:t>matters</a:t>
+            </a:r>
+            <a:r>
+              <a:rPr lang="en-CO" sz="1200" kern="1200" dirty="0">
+                <a:solidFill>
+                  <a:schemeClr val="tx1"/>
+                </a:solidFill>
+                <a:effectLst/>
+                <a:latin typeface="+mn-lt"/>
+                <a:ea typeface="+mn-ea"/>
+                <a:cs typeface="+mn-cs"/>
+              </a:rPr>
+              <a:t>. Both: healthy and sick individuals are needed for an adequate comparison and analyst.</a:t>
+            </a:r>
+          </a:p>
+          <a:p>
+            <a:pPr lvl="0"/>
+            <a:r>
+              <a:rPr lang="en-CO" sz="1200" b="1" kern="1200" dirty="0">
+                <a:solidFill>
+                  <a:schemeClr val="tx1"/>
+                </a:solidFill>
+                <a:effectLst/>
+                <a:latin typeface="+mn-lt"/>
+                <a:ea typeface="+mn-ea"/>
+                <a:cs typeface="+mn-cs"/>
+              </a:rPr>
+              <a:t>Correlation is not causation.</a:t>
+            </a:r>
+            <a:endParaRPr lang="en-CO" sz="1200" kern="1200" dirty="0">
+              <a:solidFill>
+                <a:schemeClr val="tx1"/>
+              </a:solidFill>
+              <a:effectLst/>
+              <a:latin typeface="+mn-lt"/>
+              <a:ea typeface="+mn-ea"/>
+              <a:cs typeface="+mn-cs"/>
+            </a:endParaRPr>
+          </a:p>
+          <a:p>
+            <a:pPr lvl="0"/>
+            <a:r>
+              <a:rPr lang="en-US" sz="1200" kern="1200" dirty="0">
+                <a:solidFill>
+                  <a:schemeClr val="tx1"/>
+                </a:solidFill>
+                <a:effectLst/>
+                <a:latin typeface="+mn-lt"/>
+                <a:ea typeface="+mn-ea"/>
+                <a:cs typeface="+mn-cs"/>
+              </a:rPr>
+              <a:t>AS WE SHOW IN M</a:t>
+            </a:r>
+            <a:r>
+              <a:rPr lang="en-CO" sz="1200" kern="1200" dirty="0">
+                <a:solidFill>
+                  <a:schemeClr val="tx1"/>
+                </a:solidFill>
+                <a:effectLst/>
+                <a:latin typeface="+mn-lt"/>
+                <a:ea typeface="+mn-ea"/>
+                <a:cs typeface="+mn-cs"/>
+              </a:rPr>
+              <a:t>arried status AFTER adjusted per age.</a:t>
+            </a:r>
+          </a:p>
+          <a:p>
+            <a:endParaRPr lang="x-none" dirty="0"/>
           </a:p>
         </p:txBody>
       </p:sp>
@@ -1273,7 +2225,7 @@
           <a:p>
             <a:fld id="{7308F95E-67AE-0945-83C2-BF4ED4EB9327}" type="datetimeFigureOut">
               <a:rPr lang="x-none" smtClean="0"/>
-              <a:t>14/11/25</a:t>
+              <a:t>15/11/25</a:t>
             </a:fld>
             <a:endParaRPr lang="x-none"/>
           </a:p>
@@ -1473,7 +2425,7 @@
           <a:p>
             <a:fld id="{7308F95E-67AE-0945-83C2-BF4ED4EB9327}" type="datetimeFigureOut">
               <a:rPr lang="x-none" smtClean="0"/>
-              <a:t>14/11/25</a:t>
+              <a:t>15/11/25</a:t>
             </a:fld>
             <a:endParaRPr lang="x-none"/>
           </a:p>
@@ -1683,7 +2635,7 @@
           <a:p>
             <a:fld id="{7308F95E-67AE-0945-83C2-BF4ED4EB9327}" type="datetimeFigureOut">
               <a:rPr lang="x-none" smtClean="0"/>
-              <a:t>14/11/25</a:t>
+              <a:t>15/11/25</a:t>
             </a:fld>
             <a:endParaRPr lang="x-none"/>
           </a:p>
@@ -1883,7 +2835,7 @@
           <a:p>
             <a:fld id="{7308F95E-67AE-0945-83C2-BF4ED4EB9327}" type="datetimeFigureOut">
               <a:rPr lang="x-none" smtClean="0"/>
-              <a:t>14/11/25</a:t>
+              <a:t>15/11/25</a:t>
             </a:fld>
             <a:endParaRPr lang="x-none"/>
           </a:p>
@@ -2159,7 +3111,7 @@
           <a:p>
             <a:fld id="{7308F95E-67AE-0945-83C2-BF4ED4EB9327}" type="datetimeFigureOut">
               <a:rPr lang="x-none" smtClean="0"/>
-              <a:t>14/11/25</a:t>
+              <a:t>15/11/25</a:t>
             </a:fld>
             <a:endParaRPr lang="x-none"/>
           </a:p>
@@ -2427,7 +3379,7 @@
           <a:p>
             <a:fld id="{7308F95E-67AE-0945-83C2-BF4ED4EB9327}" type="datetimeFigureOut">
               <a:rPr lang="x-none" smtClean="0"/>
-              <a:t>14/11/25</a:t>
+              <a:t>15/11/25</a:t>
             </a:fld>
             <a:endParaRPr lang="x-none"/>
           </a:p>
@@ -2842,7 +3794,7 @@
           <a:p>
             <a:fld id="{7308F95E-67AE-0945-83C2-BF4ED4EB9327}" type="datetimeFigureOut">
               <a:rPr lang="x-none" smtClean="0"/>
-              <a:t>14/11/25</a:t>
+              <a:t>15/11/25</a:t>
             </a:fld>
             <a:endParaRPr lang="x-none"/>
           </a:p>
@@ -2984,7 +3936,7 @@
           <a:p>
             <a:fld id="{7308F95E-67AE-0945-83C2-BF4ED4EB9327}" type="datetimeFigureOut">
               <a:rPr lang="x-none" smtClean="0"/>
-              <a:t>14/11/25</a:t>
+              <a:t>15/11/25</a:t>
             </a:fld>
             <a:endParaRPr lang="x-none"/>
           </a:p>
@@ -3097,7 +4049,7 @@
           <a:p>
             <a:fld id="{7308F95E-67AE-0945-83C2-BF4ED4EB9327}" type="datetimeFigureOut">
               <a:rPr lang="x-none" smtClean="0"/>
-              <a:t>14/11/25</a:t>
+              <a:t>15/11/25</a:t>
             </a:fld>
             <a:endParaRPr lang="x-none"/>
           </a:p>
@@ -3410,7 +4362,7 @@
           <a:p>
             <a:fld id="{7308F95E-67AE-0945-83C2-BF4ED4EB9327}" type="datetimeFigureOut">
               <a:rPr lang="x-none" smtClean="0"/>
-              <a:t>14/11/25</a:t>
+              <a:t>15/11/25</a:t>
             </a:fld>
             <a:endParaRPr lang="x-none"/>
           </a:p>
@@ -3699,7 +4651,7 @@
           <a:p>
             <a:fld id="{7308F95E-67AE-0945-83C2-BF4ED4EB9327}" type="datetimeFigureOut">
               <a:rPr lang="x-none" smtClean="0"/>
-              <a:t>14/11/25</a:t>
+              <a:t>15/11/25</a:t>
             </a:fld>
             <a:endParaRPr lang="x-none"/>
           </a:p>
@@ -3942,7 +4894,7 @@
           <a:p>
             <a:fld id="{7308F95E-67AE-0945-83C2-BF4ED4EB9327}" type="datetimeFigureOut">
               <a:rPr lang="x-none" smtClean="0"/>
-              <a:t>14/11/25</a:t>
+              <a:t>15/11/25</a:t>
             </a:fld>
             <a:endParaRPr lang="x-none"/>
           </a:p>
@@ -8322,7 +9274,7 @@
             </a:pPr>
             <a:r>
               <a:rPr lang="en-US" sz="1800" dirty="0"/>
-              <a:t>Correlation is not causation: protective and risk factors can emerge.</a:t>
+              <a:t>Correlation is not causation: Adjusted per age</a:t>
             </a:r>
           </a:p>
         </p:txBody>
@@ -8359,10 +9311,10 @@
       </p:pic>
       <p:pic>
         <p:nvPicPr>
-          <p:cNvPr id="7" name="Picture 6" descr="A graph with red bars&#10;&#10;AI-generated content may be incorrect.">
+          <p:cNvPr id="6" name="Picture 5" descr="A graph of a graph with a number of red squares&#10;&#10;AI-generated content may be incorrect.">
             <a:extLst>
               <a:ext uri="{FF2B5EF4-FFF2-40B4-BE49-F238E27FC236}">
-                <a16:creationId xmlns:a16="http://schemas.microsoft.com/office/drawing/2014/main" id="{21F61FB1-4161-28AE-248D-4CE11D5C120C}"/>
+                <a16:creationId xmlns:a16="http://schemas.microsoft.com/office/drawing/2014/main" id="{F8B1184F-90BF-5C04-8C4D-2CFBE754E681}"/>
               </a:ext>
             </a:extLst>
           </p:cNvPr>
@@ -8379,8 +9331,8 @@
         </p:blipFill>
         <p:spPr>
           <a:xfrm>
-            <a:off x="4893841" y="3494569"/>
-            <a:ext cx="6817623" cy="3146595"/>
+            <a:off x="4262906" y="3789526"/>
+            <a:ext cx="7772400" cy="2690446"/>
           </a:xfrm>
           <a:prstGeom prst="rect">
             <a:avLst/>

</xml_diff>